<commit_message>
Added an updated picture and the words patent pending.
</commit_message>
<xml_diff>
--- a/ChaprSVN/Promo/Flyer (2).pptx
+++ b/ChaprSVN/Promo/Flyer (2).pptx
@@ -324,12 +324,12 @@
             <a:pPr>
               <a:defRPr/>
             </a:pPr>
-            <a:fld id="{D7AF95B0-8DE2-4830-8C9B-9845C15FB143}" type="datetimeFigureOut">
+            <a:fld id="{5F2D4997-D6C6-4C1A-8F60-EB877E144D3F}" type="datetimeFigureOut">
               <a:rPr lang="en-US"/>
               <a:pPr>
                 <a:defRPr/>
               </a:pPr>
-              <a:t>12/5/2013</a:t>
+              <a:t>2/26/2014</a:t>
             </a:fld>
             <a:endParaRPr lang="en-US"/>
           </a:p>
@@ -383,7 +383,7 @@
             <a:pPr>
               <a:defRPr/>
             </a:pPr>
-            <a:fld id="{ADBBC2F4-9605-41F2-935C-BA887FD62B4A}" type="slidenum">
+            <a:fld id="{F947F5C5-74DD-4A04-9D3E-75199EACA6C0}" type="slidenum">
               <a:rPr lang="en-US"/>
               <a:pPr>
                 <a:defRPr/>
@@ -516,12 +516,12 @@
             <a:pPr>
               <a:defRPr/>
             </a:pPr>
-            <a:fld id="{FEAA0817-6A69-4058-BFDF-D2E684531828}" type="datetimeFigureOut">
+            <a:fld id="{636238CE-36FB-4307-86D4-4009392D8502}" type="datetimeFigureOut">
               <a:rPr lang="en-US"/>
               <a:pPr>
                 <a:defRPr/>
               </a:pPr>
-              <a:t>12/5/2013</a:t>
+              <a:t>2/26/2014</a:t>
             </a:fld>
             <a:endParaRPr lang="en-US"/>
           </a:p>
@@ -575,7 +575,7 @@
             <a:pPr>
               <a:defRPr/>
             </a:pPr>
-            <a:fld id="{B59FDEEF-009F-4ABC-8D0A-1A3ACBFBCA84}" type="slidenum">
+            <a:fld id="{ACB49829-88F6-4546-869B-43E260576241}" type="slidenum">
               <a:rPr lang="en-US"/>
               <a:pPr>
                 <a:defRPr/>
@@ -718,12 +718,12 @@
             <a:pPr>
               <a:defRPr/>
             </a:pPr>
-            <a:fld id="{43F93E0A-A40F-4248-B215-AD1FC6695F37}" type="datetimeFigureOut">
+            <a:fld id="{B4C9070B-9B63-40F5-BED3-6E6259F43540}" type="datetimeFigureOut">
               <a:rPr lang="en-US"/>
               <a:pPr>
                 <a:defRPr/>
               </a:pPr>
-              <a:t>12/5/2013</a:t>
+              <a:t>2/26/2014</a:t>
             </a:fld>
             <a:endParaRPr lang="en-US"/>
           </a:p>
@@ -777,7 +777,7 @@
             <a:pPr>
               <a:defRPr/>
             </a:pPr>
-            <a:fld id="{8CCCD149-A1E5-4E1A-83CE-6FD3A78A5E40}" type="slidenum">
+            <a:fld id="{55F724B5-4FC3-4A92-8F08-0FE918B491FE}" type="slidenum">
               <a:rPr lang="en-US"/>
               <a:pPr>
                 <a:defRPr/>
@@ -910,12 +910,12 @@
             <a:pPr>
               <a:defRPr/>
             </a:pPr>
-            <a:fld id="{D000CAFA-A19D-4FCA-928C-02DE75ED20EB}" type="datetimeFigureOut">
+            <a:fld id="{5A99E2A8-FBD8-4BFB-9BFB-A2230E497817}" type="datetimeFigureOut">
               <a:rPr lang="en-US"/>
               <a:pPr>
                 <a:defRPr/>
               </a:pPr>
-              <a:t>12/5/2013</a:t>
+              <a:t>2/26/2014</a:t>
             </a:fld>
             <a:endParaRPr lang="en-US"/>
           </a:p>
@@ -969,7 +969,7 @@
             <a:pPr>
               <a:defRPr/>
             </a:pPr>
-            <a:fld id="{69C7E354-0443-4B6F-8D0C-966FD52C43FD}" type="slidenum">
+            <a:fld id="{C236C9C1-1923-48C0-8106-741CA3BF72AA}" type="slidenum">
               <a:rPr lang="en-US"/>
               <a:pPr>
                 <a:defRPr/>
@@ -1178,12 +1178,12 @@
             <a:pPr>
               <a:defRPr/>
             </a:pPr>
-            <a:fld id="{22032B26-9A69-476B-9D8F-4E6F04272769}" type="datetimeFigureOut">
+            <a:fld id="{1407EF8D-4D3C-41CF-ADFA-F4BB5B7CB10D}" type="datetimeFigureOut">
               <a:rPr lang="en-US"/>
               <a:pPr>
                 <a:defRPr/>
               </a:pPr>
-              <a:t>12/5/2013</a:t>
+              <a:t>2/26/2014</a:t>
             </a:fld>
             <a:endParaRPr lang="en-US"/>
           </a:p>
@@ -1237,7 +1237,7 @@
             <a:pPr>
               <a:defRPr/>
             </a:pPr>
-            <a:fld id="{5AACDDEA-316A-4A85-81A7-8D17B5B63CAA}" type="slidenum">
+            <a:fld id="{3A9A2ADE-F8D7-405E-B8EE-63FC05BC089D}" type="slidenum">
               <a:rPr lang="en-US"/>
               <a:pPr>
                 <a:defRPr/>
@@ -1488,12 +1488,12 @@
             <a:pPr>
               <a:defRPr/>
             </a:pPr>
-            <a:fld id="{0E21CF78-1095-41CD-9276-833A2FD7E062}" type="datetimeFigureOut">
+            <a:fld id="{F05E28CC-AA5C-41D3-9CF0-80EDE0E49F9C}" type="datetimeFigureOut">
               <a:rPr lang="en-US"/>
               <a:pPr>
                 <a:defRPr/>
               </a:pPr>
-              <a:t>12/5/2013</a:t>
+              <a:t>2/26/2014</a:t>
             </a:fld>
             <a:endParaRPr lang="en-US"/>
           </a:p>
@@ -1547,7 +1547,7 @@
             <a:pPr>
               <a:defRPr/>
             </a:pPr>
-            <a:fld id="{2B1D156A-88C9-4EF4-A1F1-5558E354A799}" type="slidenum">
+            <a:fld id="{67395B57-14BC-4633-93CE-7CE18D8DBC9F}" type="slidenum">
               <a:rPr lang="en-US"/>
               <a:pPr>
                 <a:defRPr/>
@@ -1937,12 +1937,12 @@
             <a:pPr>
               <a:defRPr/>
             </a:pPr>
-            <a:fld id="{26E2DACE-269D-47DA-AECE-AD3A795923B2}" type="datetimeFigureOut">
+            <a:fld id="{246E6FD4-C9F4-4447-B0B1-152342B72DEE}" type="datetimeFigureOut">
               <a:rPr lang="en-US"/>
               <a:pPr>
                 <a:defRPr/>
               </a:pPr>
-              <a:t>12/5/2013</a:t>
+              <a:t>2/26/2014</a:t>
             </a:fld>
             <a:endParaRPr lang="en-US"/>
           </a:p>
@@ -1996,7 +1996,7 @@
             <a:pPr>
               <a:defRPr/>
             </a:pPr>
-            <a:fld id="{273E7D36-5A9A-4B89-92F7-73B14D2D0C35}" type="slidenum">
+            <a:fld id="{4D9442A8-6E9E-4D80-A6FF-4F5F73D1F4C2}" type="slidenum">
               <a:rPr lang="en-US"/>
               <a:pPr>
                 <a:defRPr/>
@@ -2077,12 +2077,12 @@
             <a:pPr>
               <a:defRPr/>
             </a:pPr>
-            <a:fld id="{84926186-C7C1-4BC5-935A-C7F85BE75BEA}" type="datetimeFigureOut">
+            <a:fld id="{3F24826F-8D51-412B-A3B7-B326C4D30D5E}" type="datetimeFigureOut">
               <a:rPr lang="en-US"/>
               <a:pPr>
                 <a:defRPr/>
               </a:pPr>
-              <a:t>12/5/2013</a:t>
+              <a:t>2/26/2014</a:t>
             </a:fld>
             <a:endParaRPr lang="en-US"/>
           </a:p>
@@ -2136,7 +2136,7 @@
             <a:pPr>
               <a:defRPr/>
             </a:pPr>
-            <a:fld id="{6D2C86DB-EE07-412C-B201-E10820759619}" type="slidenum">
+            <a:fld id="{D19FE8E1-C1C3-4F58-BFB4-4956D52622B1}" type="slidenum">
               <a:rPr lang="en-US"/>
               <a:pPr>
                 <a:defRPr/>
@@ -2194,12 +2194,12 @@
             <a:pPr>
               <a:defRPr/>
             </a:pPr>
-            <a:fld id="{F5071D64-9346-4080-B6CA-58D82C3A44BB}" type="datetimeFigureOut">
+            <a:fld id="{34103362-B66F-43B1-A9DD-2087BA8921EE}" type="datetimeFigureOut">
               <a:rPr lang="en-US"/>
               <a:pPr>
                 <a:defRPr/>
               </a:pPr>
-              <a:t>12/5/2013</a:t>
+              <a:t>2/26/2014</a:t>
             </a:fld>
             <a:endParaRPr lang="en-US"/>
           </a:p>
@@ -2253,7 +2253,7 @@
             <a:pPr>
               <a:defRPr/>
             </a:pPr>
-            <a:fld id="{711FDE25-A896-4AA4-AB34-3759B4702E23}" type="slidenum">
+            <a:fld id="{758242A8-C49E-42D1-A2D7-955CFAE6F38A}" type="slidenum">
               <a:rPr lang="en-US"/>
               <a:pPr>
                 <a:defRPr/>
@@ -2493,12 +2493,12 @@
             <a:pPr>
               <a:defRPr/>
             </a:pPr>
-            <a:fld id="{4AC423F6-3CA3-49A3-8747-0D7E29A5514B}" type="datetimeFigureOut">
+            <a:fld id="{494D5739-F77E-4BAD-BA2B-FADF725F06F2}" type="datetimeFigureOut">
               <a:rPr lang="en-US"/>
               <a:pPr>
                 <a:defRPr/>
               </a:pPr>
-              <a:t>12/5/2013</a:t>
+              <a:t>2/26/2014</a:t>
             </a:fld>
             <a:endParaRPr lang="en-US"/>
           </a:p>
@@ -2552,7 +2552,7 @@
             <a:pPr>
               <a:defRPr/>
             </a:pPr>
-            <a:fld id="{08FF8CF1-C347-4301-A254-762360CFCF5E}" type="slidenum">
+            <a:fld id="{C5E40333-027D-4CA1-BFE5-A1F4044B6F71}" type="slidenum">
               <a:rPr lang="en-US"/>
               <a:pPr>
                 <a:defRPr/>
@@ -2771,12 +2771,12 @@
             <a:pPr>
               <a:defRPr/>
             </a:pPr>
-            <a:fld id="{E2AC0089-C3F8-4EDA-A1C4-3BE85275039B}" type="datetimeFigureOut">
+            <a:fld id="{CD148930-A637-439C-93CA-F31FA1E4ED83}" type="datetimeFigureOut">
               <a:rPr lang="en-US"/>
               <a:pPr>
                 <a:defRPr/>
               </a:pPr>
-              <a:t>12/5/2013</a:t>
+              <a:t>2/26/2014</a:t>
             </a:fld>
             <a:endParaRPr lang="en-US"/>
           </a:p>
@@ -2830,7 +2830,7 @@
             <a:pPr>
               <a:defRPr/>
             </a:pPr>
-            <a:fld id="{982BA187-51A1-47EB-BD25-A1314804D3D2}" type="slidenum">
+            <a:fld id="{E31FDD20-3330-4C58-8A9B-70DBAFFE00CB}" type="slidenum">
               <a:rPr lang="en-US"/>
               <a:pPr>
                 <a:defRPr/>
@@ -3012,7 +3012,7 @@
               <a:spcAft>
                 <a:spcPts val="0"/>
               </a:spcAft>
-              <a:defRPr sz="1200" smtClean="0">
+              <a:defRPr sz="1200">
                 <a:solidFill>
                   <a:schemeClr val="tx1">
                     <a:tint val="75000"/>
@@ -3027,12 +3027,12 @@
             <a:pPr>
               <a:defRPr/>
             </a:pPr>
-            <a:fld id="{453ADDBD-C911-4572-B9A5-9881A403005A}" type="datetimeFigureOut">
+            <a:fld id="{256AA2EB-7DDE-4047-80D3-E514A177A36A}" type="datetimeFigureOut">
               <a:rPr lang="en-US"/>
               <a:pPr>
                 <a:defRPr/>
               </a:pPr>
-              <a:t>12/5/2013</a:t>
+              <a:t>2/26/2014</a:t>
             </a:fld>
             <a:endParaRPr lang="en-US"/>
           </a:p>
@@ -3115,7 +3115,7 @@
               <a:spcAft>
                 <a:spcPts val="0"/>
               </a:spcAft>
-              <a:defRPr sz="1200" smtClean="0">
+              <a:defRPr sz="1200">
                 <a:solidFill>
                   <a:schemeClr val="tx1">
                     <a:tint val="75000"/>
@@ -3130,7 +3130,7 @@
             <a:pPr>
               <a:defRPr/>
             </a:pPr>
-            <a:fld id="{AEFF47B1-5C08-4DDC-AEF6-5854D9F5529B}" type="slidenum">
+            <a:fld id="{C2E2C9CD-A2C5-4DA4-ABED-73321BCF1C03}" type="slidenum">
               <a:rPr lang="en-US"/>
               <a:pPr>
                 <a:defRPr/>
@@ -3159,7 +3159,7 @@
   </p:sldLayoutIdLst>
   <p:txStyles>
     <p:titleStyle>
-      <a:lvl1pPr algn="ctr" rtl="0" fontAlgn="base">
+      <a:lvl1pPr algn="ctr" rtl="0" eaLnBrk="0" fontAlgn="base" hangingPunct="0">
         <a:spcBef>
           <a:spcPct val="0"/>
         </a:spcBef>
@@ -3175,7 +3175,7 @@
           <a:cs typeface="+mj-cs"/>
         </a:defRPr>
       </a:lvl1pPr>
-      <a:lvl2pPr algn="ctr" rtl="0" fontAlgn="base">
+      <a:lvl2pPr algn="ctr" rtl="0" eaLnBrk="0" fontAlgn="base" hangingPunct="0">
         <a:spcBef>
           <a:spcPct val="0"/>
         </a:spcBef>
@@ -3189,7 +3189,7 @@
           <a:latin typeface="Calibri" pitchFamily="34" charset="0"/>
         </a:defRPr>
       </a:lvl2pPr>
-      <a:lvl3pPr algn="ctr" rtl="0" fontAlgn="base">
+      <a:lvl3pPr algn="ctr" rtl="0" eaLnBrk="0" fontAlgn="base" hangingPunct="0">
         <a:spcBef>
           <a:spcPct val="0"/>
         </a:spcBef>
@@ -3203,7 +3203,7 @@
           <a:latin typeface="Calibri" pitchFamily="34" charset="0"/>
         </a:defRPr>
       </a:lvl3pPr>
-      <a:lvl4pPr algn="ctr" rtl="0" fontAlgn="base">
+      <a:lvl4pPr algn="ctr" rtl="0" eaLnBrk="0" fontAlgn="base" hangingPunct="0">
         <a:spcBef>
           <a:spcPct val="0"/>
         </a:spcBef>
@@ -3217,7 +3217,7 @@
           <a:latin typeface="Calibri" pitchFamily="34" charset="0"/>
         </a:defRPr>
       </a:lvl4pPr>
-      <a:lvl5pPr algn="ctr" rtl="0" fontAlgn="base">
+      <a:lvl5pPr algn="ctr" rtl="0" eaLnBrk="0" fontAlgn="base" hangingPunct="0">
         <a:spcBef>
           <a:spcPct val="0"/>
         </a:spcBef>
@@ -3289,7 +3289,7 @@
       </a:lvl9pPr>
     </p:titleStyle>
     <p:bodyStyle>
-      <a:lvl1pPr marL="342900" indent="-342900" algn="l" rtl="0" fontAlgn="base">
+      <a:lvl1pPr marL="342900" indent="-342900" algn="l" rtl="0" eaLnBrk="0" fontAlgn="base" hangingPunct="0">
         <a:spcBef>
           <a:spcPct val="20000"/>
         </a:spcBef>
@@ -3307,7 +3307,7 @@
           <a:cs typeface="+mn-cs"/>
         </a:defRPr>
       </a:lvl1pPr>
-      <a:lvl2pPr marL="742950" indent="-285750" algn="l" rtl="0" fontAlgn="base">
+      <a:lvl2pPr marL="742950" indent="-285750" algn="l" rtl="0" eaLnBrk="0" fontAlgn="base" hangingPunct="0">
         <a:spcBef>
           <a:spcPct val="20000"/>
         </a:spcBef>
@@ -3325,7 +3325,7 @@
           <a:cs typeface="+mn-cs"/>
         </a:defRPr>
       </a:lvl2pPr>
-      <a:lvl3pPr marL="1143000" indent="-228600" algn="l" rtl="0" fontAlgn="base">
+      <a:lvl3pPr marL="1143000" indent="-228600" algn="l" rtl="0" eaLnBrk="0" fontAlgn="base" hangingPunct="0">
         <a:spcBef>
           <a:spcPct val="20000"/>
         </a:spcBef>
@@ -3343,7 +3343,7 @@
           <a:cs typeface="+mn-cs"/>
         </a:defRPr>
       </a:lvl3pPr>
-      <a:lvl4pPr marL="1600200" indent="-228600" algn="l" rtl="0" fontAlgn="base">
+      <a:lvl4pPr marL="1600200" indent="-228600" algn="l" rtl="0" eaLnBrk="0" fontAlgn="base" hangingPunct="0">
         <a:spcBef>
           <a:spcPct val="20000"/>
         </a:spcBef>
@@ -3361,7 +3361,7 @@
           <a:cs typeface="+mn-cs"/>
         </a:defRPr>
       </a:lvl4pPr>
-      <a:lvl5pPr marL="2057400" indent="-228600" algn="l" rtl="0" fontAlgn="base">
+      <a:lvl5pPr marL="2057400" indent="-228600" algn="l" rtl="0" eaLnBrk="0" fontAlgn="base" hangingPunct="0">
         <a:spcBef>
           <a:spcPct val="20000"/>
         </a:spcBef>
@@ -3578,7 +3578,7 @@
           </a:bodyPr>
           <a:lstStyle/>
           <a:p>
-            <a:pPr fontAlgn="auto">
+            <a:pPr eaLnBrk="1" fontAlgn="auto" hangingPunct="1">
               <a:spcAft>
                 <a:spcPts val="0"/>
               </a:spcAft>
@@ -3636,7 +3636,7 @@
               <a:defRPr/>
             </a:pPr>
             <a:r>
-              <a:rPr lang="en-US" sz="4000" dirty="0" err="1" smtClean="0">
+              <a:rPr lang="en-US" sz="4000" dirty="0" err="1">
                 <a:solidFill>
                   <a:schemeClr val="tx2">
                     <a:lumMod val="60000"/>
@@ -3650,7 +3650,7 @@
               <a:t>ChapR</a:t>
             </a:r>
             <a:r>
-              <a:rPr lang="en-US" sz="2000" baseline="80000" dirty="0" err="1" smtClean="0">
+              <a:rPr lang="en-US" sz="2000" baseline="80000" dirty="0" err="1">
                 <a:solidFill>
                   <a:schemeClr val="tx2">
                     <a:lumMod val="60000"/>
@@ -3679,11 +3679,13 @@
       </p:sp>
       <p:sp>
         <p:nvSpPr>
-          <p:cNvPr id="5" name="TextBox 4"/>
-          <p:cNvSpPr txBox="1"/>
+          <p:cNvPr id="13315" name="TextBox 4"/>
+          <p:cNvSpPr txBox="1">
+            <a:spLocks noChangeArrowheads="1"/>
+          </p:cNvSpPr>
           <p:nvPr/>
         </p:nvSpPr>
-        <p:spPr>
+        <p:spPr bwMode="auto">
           <a:xfrm>
             <a:off x="304800" y="3962400"/>
             <a:ext cx="4191000" cy="1190625"/>
@@ -3692,6 +3694,12 @@
             <a:avLst/>
           </a:prstGeom>
           <a:noFill/>
+          <a:ln w="9525">
+            <a:noFill/>
+            <a:miter lim="800000"/>
+            <a:headEnd/>
+            <a:tailEnd/>
+          </a:ln>
         </p:spPr>
         <p:txBody>
           <a:bodyPr>
@@ -3700,7 +3708,7 @@
           <a:lstStyle/>
           <a:p>
             <a:r>
-              <a:rPr lang="en-US" dirty="0">
+              <a:rPr lang="en-US">
                 <a:solidFill>
                   <a:srgbClr val="558ED5"/>
                 </a:solidFill>
@@ -3711,7 +3719,7 @@
           </a:p>
           <a:p>
             <a:r>
-              <a:rPr lang="en-US" dirty="0">
+              <a:rPr lang="en-US">
                 <a:latin typeface="Calibri" pitchFamily="34" charset="0"/>
               </a:rPr>
               <a:t>Chap Robotics now has 4 FTC teams and 1 FRC team. It is associated with Westlake High School.</a:t>
@@ -3721,14 +3729,128 @@
       </p:sp>
       <p:sp>
         <p:nvSpPr>
-          <p:cNvPr id="7" name="TextBox 6"/>
+          <p:cNvPr id="13316" name="TextBox 6"/>
+          <p:cNvSpPr txBox="1">
+            <a:spLocks noChangeArrowheads="1"/>
+          </p:cNvSpPr>
+          <p:nvPr/>
+        </p:nvSpPr>
+        <p:spPr bwMode="auto">
+          <a:xfrm>
+            <a:off x="4724400" y="4191000"/>
+            <a:ext cx="4495800" cy="2563813"/>
+          </a:xfrm>
+          <a:prstGeom prst="rect">
+            <a:avLst/>
+          </a:prstGeom>
+          <a:noFill/>
+          <a:ln w="9525">
+            <a:noFill/>
+            <a:miter lim="800000"/>
+            <a:headEnd/>
+            <a:tailEnd/>
+          </a:ln>
+        </p:spPr>
+        <p:txBody>
+          <a:bodyPr>
+            <a:spAutoFit/>
+          </a:bodyPr>
+          <a:lstStyle/>
+          <a:p>
+            <a:r>
+              <a:rPr lang="en-US">
+                <a:solidFill>
+                  <a:srgbClr val="558ED5"/>
+                </a:solidFill>
+                <a:latin typeface="Calibri" pitchFamily="34" charset="0"/>
+              </a:rPr>
+              <a:t>Features include:</a:t>
+            </a:r>
+          </a:p>
+          <a:p>
+            <a:pPr>
+              <a:buFont typeface="Arial" charset="0"/>
+              <a:buChar char="•"/>
+            </a:pPr>
+            <a:r>
+              <a:rPr lang="en-US">
+                <a:latin typeface="Calibri" pitchFamily="34" charset="0"/>
+              </a:rPr>
+              <a:t>Bluetooth connection to NXT brick (no computer needed!)</a:t>
+            </a:r>
+          </a:p>
+          <a:p>
+            <a:pPr>
+              <a:buFont typeface="Arial" charset="0"/>
+              <a:buChar char="•"/>
+            </a:pPr>
+            <a:r>
+              <a:rPr lang="en-US">
+                <a:latin typeface="Calibri" pitchFamily="34" charset="0"/>
+              </a:rPr>
+              <a:t>2 joysticks can be plugged in for driving</a:t>
+            </a:r>
+          </a:p>
+          <a:p>
+            <a:pPr>
+              <a:buFont typeface="Arial" charset="0"/>
+              <a:buChar char="•"/>
+            </a:pPr>
+            <a:r>
+              <a:rPr lang="en-US">
+                <a:latin typeface="Calibri" pitchFamily="34" charset="0"/>
+              </a:rPr>
+              <a:t>Button release of waitForStart() in selected program</a:t>
+            </a:r>
+          </a:p>
+          <a:p>
+            <a:pPr>
+              <a:buFont typeface="Arial" charset="0"/>
+              <a:buChar char="•"/>
+            </a:pPr>
+            <a:r>
+              <a:rPr lang="en-US">
+                <a:latin typeface="Calibri" pitchFamily="34" charset="0"/>
+              </a:rPr>
+              <a:t>Remote start of chosen teleOp program</a:t>
+            </a:r>
+          </a:p>
+          <a:p>
+            <a:pPr>
+              <a:buFont typeface="Arial" charset="0"/>
+              <a:buChar char="•"/>
+            </a:pPr>
+            <a:r>
+              <a:rPr lang="en-US">
+                <a:latin typeface="Calibri" pitchFamily="34" charset="0"/>
+              </a:rPr>
+              <a:t>Remote stop of any program</a:t>
+            </a:r>
+          </a:p>
+          <a:p>
+            <a:pPr>
+              <a:buFont typeface="Arial" charset="0"/>
+              <a:buChar char="•"/>
+            </a:pPr>
+            <a:r>
+              <a:rPr lang="en-US">
+                <a:latin typeface="Calibri" pitchFamily="34" charset="0"/>
+              </a:rPr>
+              <a:t>Compatible with RobotC, LabView and NXT-G</a:t>
+            </a:r>
+          </a:p>
+        </p:txBody>
+      </p:sp>
+      <p:sp>
+        <p:nvSpPr>
+          <p:cNvPr id="9" name="TextBox 8"/>
           <p:cNvSpPr txBox="1"/>
           <p:nvPr/>
         </p:nvSpPr>
         <p:spPr>
           <a:xfrm>
-            <a:off x="4724400" y="4038600"/>
-            <a:ext cx="4495800" cy="2585323"/>
+            <a:off x="4724400" y="3048000"/>
+            <a:ext cx="4572000" cy="1190625"/>
           </a:xfrm>
           <a:prstGeom prst="rect">
             <a:avLst/>
@@ -3742,223 +3864,43 @@
           <a:lstStyle/>
           <a:p>
             <a:r>
-              <a:rPr lang="en-US" dirty="0">
+              <a:rPr lang="en-US">
                 <a:solidFill>
                   <a:srgbClr val="558ED5"/>
                 </a:solidFill>
                 <a:latin typeface="Calibri" pitchFamily="34" charset="0"/>
               </a:rPr>
-              <a:t>Features include:</a:t>
-            </a:r>
-          </a:p>
-          <a:p>
-            <a:pPr>
-              <a:buFont typeface="Arial" charset="0"/>
-              <a:buChar char="•"/>
-            </a:pPr>
-            <a:r>
-              <a:rPr lang="en-US" dirty="0">
+              <a:t>General Info</a:t>
+            </a:r>
+          </a:p>
+          <a:p>
+            <a:r>
+              <a:rPr lang="en-US">
                 <a:latin typeface="Calibri" pitchFamily="34" charset="0"/>
               </a:rPr>
-              <a:t>Bluetooth connection to NXT brick (no computer needed!)</a:t>
-            </a:r>
-          </a:p>
-          <a:p>
-            <a:pPr>
-              <a:buFont typeface="Arial" charset="0"/>
-              <a:buChar char="•"/>
-            </a:pPr>
-            <a:r>
-              <a:rPr lang="en-US" dirty="0">
+              <a:t>The ChapR allows for drive practice without a PC, allowing for increased convenience. </a:t>
+            </a:r>
+          </a:p>
+          <a:p>
+            <a:r>
+              <a:rPr lang="en-US">
                 <a:latin typeface="Calibri" pitchFamily="34" charset="0"/>
               </a:rPr>
-              <a:t>2 joysticks can be plugged in for driving</a:t>
-            </a:r>
-          </a:p>
-          <a:p>
-            <a:pPr>
-              <a:buFont typeface="Arial" charset="0"/>
-              <a:buChar char="•"/>
-            </a:pPr>
-            <a:r>
-              <a:rPr lang="en-US" dirty="0">
-                <a:latin typeface="Calibri" pitchFamily="34" charset="0"/>
-              </a:rPr>
-              <a:t>Button release of </a:t>
-            </a:r>
-            <a:r>
-              <a:rPr lang="en-US" dirty="0" err="1">
-                <a:latin typeface="Calibri" pitchFamily="34" charset="0"/>
-              </a:rPr>
-              <a:t>waitForStart</a:t>
-            </a:r>
-            <a:r>
-              <a:rPr lang="en-US" dirty="0">
-                <a:latin typeface="Calibri" pitchFamily="34" charset="0"/>
-              </a:rPr>
-              <a:t>() in selected </a:t>
-            </a:r>
-            <a:r>
-              <a:rPr lang="en-US" dirty="0" smtClean="0">
-                <a:latin typeface="Calibri" pitchFamily="34" charset="0"/>
-              </a:rPr>
-              <a:t>program</a:t>
-            </a:r>
-          </a:p>
-          <a:p>
-            <a:pPr>
-              <a:buFont typeface="Arial" charset="0"/>
-              <a:buChar char="•"/>
-            </a:pPr>
-            <a:r>
-              <a:rPr lang="en-US" dirty="0" smtClean="0">
-                <a:latin typeface="Calibri" pitchFamily="34" charset="0"/>
-              </a:rPr>
-              <a:t>Remote start of chosen </a:t>
-            </a:r>
-            <a:r>
-              <a:rPr lang="en-US" dirty="0" err="1" smtClean="0">
-                <a:latin typeface="Calibri" pitchFamily="34" charset="0"/>
-              </a:rPr>
-              <a:t>teleOp</a:t>
-            </a:r>
-            <a:r>
-              <a:rPr lang="en-US" dirty="0" smtClean="0">
-                <a:latin typeface="Calibri" pitchFamily="34" charset="0"/>
-              </a:rPr>
-              <a:t> program</a:t>
-            </a:r>
-          </a:p>
-          <a:p>
-            <a:pPr>
-              <a:buFont typeface="Arial" charset="0"/>
-              <a:buChar char="•"/>
-            </a:pPr>
-            <a:r>
-              <a:rPr lang="en-US" dirty="0" smtClean="0">
-                <a:latin typeface="Calibri" pitchFamily="34" charset="0"/>
-              </a:rPr>
-              <a:t>Remote stop of any program</a:t>
-            </a:r>
-            <a:endParaRPr lang="en-US" dirty="0">
-              <a:latin typeface="Calibri" pitchFamily="34" charset="0"/>
-            </a:endParaRPr>
-          </a:p>
-          <a:p>
-            <a:pPr>
-              <a:buFont typeface="Arial" charset="0"/>
-              <a:buChar char="•"/>
-            </a:pPr>
-            <a:r>
-              <a:rPr lang="en-US" dirty="0">
-                <a:latin typeface="Calibri" pitchFamily="34" charset="0"/>
-              </a:rPr>
-              <a:t>Compatible with RobotC, </a:t>
-            </a:r>
-            <a:r>
-              <a:rPr lang="en-US" dirty="0" err="1">
-                <a:latin typeface="Calibri" pitchFamily="34" charset="0"/>
-              </a:rPr>
-              <a:t>LabView</a:t>
-            </a:r>
-            <a:r>
-              <a:rPr lang="en-US" dirty="0">
-                <a:latin typeface="Calibri" pitchFamily="34" charset="0"/>
-              </a:rPr>
-              <a:t> and NXT-G</a:t>
-            </a:r>
-          </a:p>
-        </p:txBody>
-      </p:sp>
-      <p:sp>
-        <p:nvSpPr>
-          <p:cNvPr id="9" name="TextBox 8"/>
-          <p:cNvSpPr txBox="1"/>
-          <p:nvPr/>
-        </p:nvSpPr>
-        <p:spPr>
-          <a:xfrm>
-            <a:off x="4724400" y="3048000"/>
-            <a:ext cx="4572000" cy="915988"/>
-          </a:xfrm>
-          <a:prstGeom prst="rect">
-            <a:avLst/>
-          </a:prstGeom>
-          <a:noFill/>
-        </p:spPr>
-        <p:txBody>
-          <a:bodyPr>
-            <a:spAutoFit/>
-          </a:bodyPr>
-          <a:lstStyle/>
-          <a:p>
-            <a:pPr fontAlgn="auto">
-              <a:spcBef>
-                <a:spcPts val="0"/>
-              </a:spcBef>
-              <a:spcAft>
-                <a:spcPts val="0"/>
-              </a:spcAft>
-              <a:defRPr/>
-            </a:pPr>
-            <a:r>
-              <a:rPr lang="en-US" dirty="0">
-                <a:solidFill>
-                  <a:schemeClr val="tx2">
-                    <a:lumMod val="60000"/>
-                    <a:lumOff val="40000"/>
-                  </a:schemeClr>
-                </a:solidFill>
-                <a:latin typeface="+mn-lt"/>
-                <a:cs typeface="+mn-cs"/>
-              </a:rPr>
-              <a:t>General Info</a:t>
-            </a:r>
-          </a:p>
-          <a:p>
-            <a:pPr fontAlgn="auto">
-              <a:spcBef>
-                <a:spcPts val="0"/>
-              </a:spcBef>
-              <a:spcAft>
-                <a:spcPts val="0"/>
-              </a:spcAft>
-              <a:defRPr/>
-            </a:pPr>
-            <a:r>
-              <a:rPr lang="en-US" dirty="0">
-                <a:latin typeface="+mn-lt"/>
-                <a:cs typeface="+mn-cs"/>
-              </a:rPr>
-              <a:t>The </a:t>
-            </a:r>
-            <a:r>
-              <a:rPr lang="en-US" dirty="0" err="1">
-                <a:latin typeface="+mn-lt"/>
-                <a:cs typeface="+mn-cs"/>
-              </a:rPr>
-              <a:t>ChapR</a:t>
-            </a:r>
-            <a:r>
-              <a:rPr lang="en-US" dirty="0">
-                <a:latin typeface="+mn-lt"/>
-                <a:cs typeface="+mn-cs"/>
-              </a:rPr>
-              <a:t> allows for drive practice without a PC, allowing for increased convenience.</a:t>
+              <a:t>Patent pending!</a:t>
             </a:r>
           </a:p>
         </p:txBody>
       </p:sp>
       <p:pic>
         <p:nvPicPr>
-          <p:cNvPr id="13319" name="Picture 12" descr="TransBirdy_Without_TitleBar_cs3.png"/>
+          <p:cNvPr id="13318" name="Picture 12" descr="TransBirdy_Without_TitleBar_cs3.png"/>
           <p:cNvPicPr>
             <a:picLocks noChangeAspect="1"/>
           </p:cNvPicPr>
           <p:nvPr/>
         </p:nvPicPr>
         <p:blipFill>
-          <a:blip r:embed="rId2" cstate="print"/>
+          <a:blip r:embed="rId2"/>
           <a:srcRect/>
           <a:stretch>
             <a:fillRect/>
@@ -3990,7 +3932,7 @@
         <p:spPr>
           <a:xfrm>
             <a:off x="304800" y="990600"/>
-            <a:ext cx="3810000" cy="2862322"/>
+            <a:ext cx="3810000" cy="2862263"/>
           </a:xfrm>
           <a:prstGeom prst="rect">
             <a:avLst/>
@@ -4075,7 +4017,7 @@
               <a:t> for less fortunate teams. Donations are encouraged; we love helping out teams in need. If you’re a team who doesn’t think a ChapR is the best decision for </a:t>
             </a:r>
             <a:r>
-              <a:rPr lang="en-US" dirty="0" smtClean="0">
+              <a:rPr lang="en-US" dirty="0">
                 <a:latin typeface="+mn-lt"/>
                 <a:cs typeface="+mn-cs"/>
               </a:rPr>
@@ -4093,7 +4035,7 @@
       </p:sp>
       <p:sp>
         <p:nvSpPr>
-          <p:cNvPr id="13322" name="TextBox 13"/>
+          <p:cNvPr id="13320" name="TextBox 13"/>
           <p:cNvSpPr txBox="1">
             <a:spLocks noChangeArrowheads="1"/>
           </p:cNvSpPr>
@@ -4140,14 +4082,14 @@
       </p:sp>
       <p:pic>
         <p:nvPicPr>
-          <p:cNvPr id="13323" name="Picture 14" descr="QRCode_vZcc6.png"/>
+          <p:cNvPr id="13321" name="Picture 14" descr="QRCode_vZcc6.png"/>
           <p:cNvPicPr>
             <a:picLocks noChangeAspect="1"/>
           </p:cNvPicPr>
           <p:nvPr/>
         </p:nvPicPr>
         <p:blipFill>
-          <a:blip r:embed="rId3" cstate="print"/>
+          <a:blip r:embed="rId3"/>
           <a:srcRect/>
           <a:stretch>
             <a:fillRect/>
@@ -4172,40 +4114,14 @@
       </p:pic>
       <p:pic>
         <p:nvPicPr>
-          <p:cNvPr id="13325" name="Picture 13" descr="v"/>
-          <p:cNvPicPr>
-            <a:picLocks noChangeAspect="1" noChangeArrowheads="1"/>
-          </p:cNvPicPr>
-          <p:nvPr/>
-        </p:nvPicPr>
-        <p:blipFill>
-          <a:blip r:embed="rId4" cstate="print"/>
-          <a:srcRect b="18033"/>
-          <a:stretch>
-            <a:fillRect/>
-          </a:stretch>
-        </p:blipFill>
-        <p:spPr bwMode="auto">
-          <a:xfrm>
-            <a:off x="5105400" y="1066800"/>
-            <a:ext cx="3098800" cy="1905000"/>
-          </a:xfrm>
-          <a:prstGeom prst="rect">
-            <a:avLst/>
-          </a:prstGeom>
-          <a:noFill/>
-        </p:spPr>
-      </p:pic>
-      <p:pic>
-        <p:nvPicPr>
-          <p:cNvPr id="13327" name="Picture 12" descr="TransBirdy_Without_TitleBar_cs3.png"/>
+          <p:cNvPr id="13323" name="Picture 12" descr="TransBirdy_Without_TitleBar_cs3.png"/>
           <p:cNvPicPr>
             <a:picLocks noChangeAspect="1"/>
           </p:cNvPicPr>
           <p:nvPr/>
         </p:nvPicPr>
         <p:blipFill>
-          <a:blip r:embed="rId2" cstate="print"/>
+          <a:blip r:embed="rId2"/>
           <a:srcRect/>
           <a:stretch>
             <a:fillRect/>
@@ -4226,6 +4142,32 @@
             <a:headEnd/>
             <a:tailEnd/>
           </a:ln>
+        </p:spPr>
+      </p:pic>
+      <p:pic>
+        <p:nvPicPr>
+          <p:cNvPr id="13325" name="Picture 13" descr="v1"/>
+          <p:cNvPicPr>
+            <a:picLocks noChangeAspect="1" noChangeArrowheads="1"/>
+          </p:cNvPicPr>
+          <p:nvPr/>
+        </p:nvPicPr>
+        <p:blipFill>
+          <a:blip r:embed="rId4"/>
+          <a:srcRect/>
+          <a:stretch>
+            <a:fillRect/>
+          </a:stretch>
+        </p:blipFill>
+        <p:spPr bwMode="auto">
+          <a:xfrm>
+            <a:off x="5181600" y="1143000"/>
+            <a:ext cx="3048000" cy="1751013"/>
+          </a:xfrm>
+          <a:prstGeom prst="rect">
+            <a:avLst/>
+          </a:prstGeom>
+          <a:noFill/>
         </p:spPr>
       </p:pic>
     </p:spTree>
@@ -4255,7 +4197,7 @@
       </p:grpSpPr>
       <p:sp>
         <p:nvSpPr>
-          <p:cNvPr id="2" name="Title 1"/>
+          <p:cNvPr id="14337" name="Title 1"/>
           <p:cNvSpPr>
             <a:spLocks noGrp="1"/>
           </p:cNvSpPr>
@@ -4270,12 +4212,10 @@
           </a:xfrm>
         </p:spPr>
         <p:txBody>
-          <a:bodyPr>
-            <a:normAutofit/>
-          </a:bodyPr>
+          <a:bodyPr/>
           <a:lstStyle/>
           <a:p>
-            <a:pPr algn="l"/>
+            <a:pPr algn="l" eaLnBrk="1" hangingPunct="1"/>
             <a:r>
               <a:rPr lang="en-US" sz="3600" smtClean="0">
                 <a:solidFill>
@@ -4289,11 +4229,13 @@
       </p:sp>
       <p:sp>
         <p:nvSpPr>
-          <p:cNvPr id="4" name="TextBox 3"/>
-          <p:cNvSpPr txBox="1"/>
+          <p:cNvPr id="14338" name="TextBox 3"/>
+          <p:cNvSpPr txBox="1">
+            <a:spLocks noChangeArrowheads="1"/>
+          </p:cNvSpPr>
           <p:nvPr/>
         </p:nvSpPr>
-        <p:spPr>
+        <p:spPr bwMode="auto">
           <a:xfrm>
             <a:off x="4800600" y="52388"/>
             <a:ext cx="3124200" cy="641350"/>
@@ -4302,6 +4244,12 @@
             <a:avLst/>
           </a:prstGeom>
           <a:noFill/>
+          <a:ln w="9525">
+            <a:noFill/>
+            <a:miter lim="800000"/>
+            <a:headEnd/>
+            <a:tailEnd/>
+          </a:ln>
         </p:spPr>
         <p:txBody>
           <a:bodyPr anchor="ctr">
@@ -4323,18 +4271,27 @@
       </p:sp>
       <p:sp>
         <p:nvSpPr>
-          <p:cNvPr id="7" name="Rectangle 6"/>
-          <p:cNvSpPr/>
+          <p:cNvPr id="14339" name="Rectangle 6"/>
+          <p:cNvSpPr>
+            <a:spLocks noChangeArrowheads="1"/>
+          </p:cNvSpPr>
           <p:nvPr/>
         </p:nvSpPr>
-        <p:spPr>
+        <p:spPr bwMode="auto">
           <a:xfrm>
             <a:off x="152400" y="3200400"/>
-            <a:ext cx="4267200" cy="3416320"/>
+            <a:ext cx="4267200" cy="3416300"/>
           </a:xfrm>
           <a:prstGeom prst="rect">
             <a:avLst/>
           </a:prstGeom>
+          <a:noFill/>
+          <a:ln w="9525">
+            <a:noFill/>
+            <a:miter lim="800000"/>
+            <a:headEnd/>
+            <a:tailEnd/>
+          </a:ln>
         </p:spPr>
         <p:txBody>
           <a:bodyPr>
@@ -4343,7 +4300,7 @@
           <a:lstStyle/>
           <a:p>
             <a:r>
-              <a:rPr lang="en-US" dirty="0">
+              <a:rPr lang="en-US">
                 <a:solidFill>
                   <a:srgbClr val="558ED5"/>
                 </a:solidFill>
@@ -4352,18 +4309,18 @@
               <a:t>Internal Design</a:t>
             </a:r>
             <a:r>
-              <a:rPr lang="en-US" dirty="0">
+              <a:rPr lang="en-US">
                 <a:latin typeface="Calibri" pitchFamily="34" charset="0"/>
               </a:rPr>
               <a:t/>
             </a:r>
             <a:br>
-              <a:rPr lang="en-US" dirty="0">
+              <a:rPr lang="en-US">
                 <a:latin typeface="Calibri" pitchFamily="34" charset="0"/>
               </a:rPr>
             </a:br>
             <a:r>
-              <a:rPr lang="en-US" dirty="0">
+              <a:rPr lang="en-US">
                 <a:latin typeface="Calibri" pitchFamily="34" charset="0"/>
               </a:rPr>
               <a:t>Custom-made board: </a:t>
@@ -4375,7 +4332,7 @@
               <a:buChar char="•"/>
             </a:pPr>
             <a:r>
-              <a:rPr lang="en-US" dirty="0">
+              <a:rPr lang="en-US">
                 <a:latin typeface="Calibri" pitchFamily="34" charset="0"/>
               </a:rPr>
               <a:t>VDIP (2 USB ports to receive joystick input)</a:t>
@@ -4387,7 +4344,7 @@
               <a:buChar char="•"/>
             </a:pPr>
             <a:r>
-              <a:rPr lang="en-US" dirty="0">
+              <a:rPr lang="en-US">
                 <a:latin typeface="Calibri" pitchFamily="34" charset="0"/>
               </a:rPr>
               <a:t>LEDs (one green and one blue)</a:t>
@@ -4399,7 +4356,7 @@
               <a:buChar char="•"/>
             </a:pPr>
             <a:r>
-              <a:rPr lang="en-US" dirty="0">
+              <a:rPr lang="en-US">
                 <a:latin typeface="Calibri" pitchFamily="34" charset="0"/>
               </a:rPr>
               <a:t>Speaker (to transmit information to user)</a:t>
@@ -4411,38 +4368,23 @@
               <a:buChar char="•"/>
             </a:pPr>
             <a:r>
-              <a:rPr lang="en-US" dirty="0" smtClean="0">
+              <a:rPr lang="en-US">
                 <a:latin typeface="Calibri" pitchFamily="34" charset="0"/>
               </a:rPr>
-              <a:t>Action Button </a:t>
-            </a:r>
-            <a:r>
-              <a:rPr lang="en-US" dirty="0">
+              <a:t>Action Button (to make the ChapR Bluetooth discoverable, start programs or release waitForStart)</a:t>
+            </a:r>
+          </a:p>
+          <a:p>
+            <a:pPr>
+              <a:buFont typeface="Arial" charset="0"/>
+              <a:buChar char="•"/>
+            </a:pPr>
+            <a:r>
+              <a:rPr lang="en-US">
                 <a:latin typeface="Calibri" pitchFamily="34" charset="0"/>
               </a:rPr>
-              <a:t>(to make the ChapR </a:t>
-            </a:r>
-            <a:r>
-              <a:rPr lang="en-US" dirty="0" smtClean="0">
-                <a:latin typeface="Calibri" pitchFamily="34" charset="0"/>
-              </a:rPr>
-              <a:t>Bluetooth discoverable, start programs or release </a:t>
-            </a:r>
-            <a:r>
-              <a:rPr lang="en-US" dirty="0" err="1" smtClean="0">
-                <a:latin typeface="Calibri" pitchFamily="34" charset="0"/>
-              </a:rPr>
-              <a:t>waitForStart</a:t>
-            </a:r>
-            <a:r>
-              <a:rPr lang="en-US" dirty="0" smtClean="0">
-                <a:latin typeface="Calibri" pitchFamily="34" charset="0"/>
-              </a:rPr>
-              <a:t>)</a:t>
-            </a:r>
-            <a:endParaRPr lang="en-US" dirty="0">
-              <a:latin typeface="Calibri" pitchFamily="34" charset="0"/>
-            </a:endParaRPr>
+              <a:t>Power Button (to turn the ChapR on/off and kill programs remotely)</a:t>
+            </a:r>
           </a:p>
           <a:p>
             <a:pPr>
@@ -4450,40 +4392,7 @@
               <a:buChar char="•"/>
             </a:pPr>
             <a:r>
-              <a:rPr lang="en-US" dirty="0">
-                <a:latin typeface="Calibri" pitchFamily="34" charset="0"/>
-              </a:rPr>
-              <a:t>Power Button (to </a:t>
-            </a:r>
-            <a:r>
-              <a:rPr lang="en-US" dirty="0" smtClean="0">
-                <a:latin typeface="Calibri" pitchFamily="34" charset="0"/>
-              </a:rPr>
-              <a:t>turn the </a:t>
-            </a:r>
-            <a:r>
-              <a:rPr lang="en-US" dirty="0">
-                <a:latin typeface="Calibri" pitchFamily="34" charset="0"/>
-              </a:rPr>
-              <a:t>ChapR </a:t>
-            </a:r>
-            <a:r>
-              <a:rPr lang="en-US" dirty="0" smtClean="0">
-                <a:latin typeface="Calibri" pitchFamily="34" charset="0"/>
-              </a:rPr>
-              <a:t>on/off and kill programs remotely)</a:t>
-            </a:r>
-            <a:endParaRPr lang="en-US" dirty="0">
-              <a:latin typeface="Calibri" pitchFamily="34" charset="0"/>
-            </a:endParaRPr>
-          </a:p>
-          <a:p>
-            <a:pPr>
-              <a:buFont typeface="Arial" charset="0"/>
-              <a:buChar char="•"/>
-            </a:pPr>
-            <a:r>
-              <a:rPr lang="en-US" dirty="0">
+              <a:rPr lang="en-US">
                 <a:latin typeface="Calibri" pitchFamily="34" charset="0"/>
               </a:rPr>
               <a:t>Bluetooth module (which sends joystick input to the NXT)</a:t>
@@ -4493,11 +4402,13 @@
       </p:sp>
       <p:sp>
         <p:nvSpPr>
-          <p:cNvPr id="8" name="Rectangle 7"/>
-          <p:cNvSpPr/>
+          <p:cNvPr id="14340" name="Rectangle 7"/>
+          <p:cNvSpPr>
+            <a:spLocks noChangeArrowheads="1"/>
+          </p:cNvSpPr>
           <p:nvPr/>
         </p:nvSpPr>
-        <p:spPr>
+        <p:spPr bwMode="auto">
           <a:xfrm>
             <a:off x="4800600" y="3200400"/>
             <a:ext cx="4343400" cy="2563813"/>
@@ -4505,6 +4416,13 @@
           <a:prstGeom prst="rect">
             <a:avLst/>
           </a:prstGeom>
+          <a:noFill/>
+          <a:ln w="9525">
+            <a:noFill/>
+            <a:miter lim="800000"/>
+            <a:headEnd/>
+            <a:tailEnd/>
+          </a:ln>
         </p:spPr>
         <p:txBody>
           <a:bodyPr>
@@ -4513,7 +4431,7 @@
           <a:lstStyle/>
           <a:p>
             <a:r>
-              <a:rPr lang="en-US" dirty="0">
+              <a:rPr lang="en-US">
                 <a:solidFill>
                   <a:srgbClr val="558ED5"/>
                 </a:solidFill>
@@ -4522,40 +4440,28 @@
               <a:t>Overall Layout</a:t>
             </a:r>
             <a:r>
-              <a:rPr lang="en-US" dirty="0">
+              <a:rPr lang="en-US">
                 <a:latin typeface="Calibri" pitchFamily="34" charset="0"/>
               </a:rPr>
               <a:t/>
             </a:r>
             <a:br>
-              <a:rPr lang="en-US" dirty="0">
+              <a:rPr lang="en-US">
                 <a:latin typeface="Calibri" pitchFamily="34" charset="0"/>
               </a:rPr>
             </a:br>
             <a:r>
-              <a:rPr lang="en-US" dirty="0">
+              <a:rPr lang="en-US">
                 <a:latin typeface="Calibri" pitchFamily="34" charset="0"/>
               </a:rPr>
-              <a:t>After the joysticks are plugged in, the ChapR pulls the joystick readings from the USB ports and formats them into something the NXT can understand and use while running its program. Then those signals are sent out over Bluetooth to the NXT based on the “personality” the ChapR is set to (RobotC, </a:t>
-            </a:r>
-            <a:r>
-              <a:rPr lang="en-US" dirty="0" err="1">
-                <a:latin typeface="Calibri" pitchFamily="34" charset="0"/>
-              </a:rPr>
-              <a:t>LabView</a:t>
-            </a:r>
-            <a:r>
-              <a:rPr lang="en-US" dirty="0">
-                <a:latin typeface="Calibri" pitchFamily="34" charset="0"/>
-              </a:rPr>
-              <a:t> or NXT-G)</a:t>
-            </a:r>
-          </a:p>
-        </p:txBody>
-      </p:sp>
-      <p:sp>
-        <p:nvSpPr>
-          <p:cNvPr id="14343" name="TextBox 9"/>
+              <a:t>After the joysticks are plugged in, the ChapR pulls the joystick readings from the USB ports and formats them into something the NXT can understand and use while running its program. Then those signals are sent out over Bluetooth to the NXT based on the “personality” the ChapR is set to (RobotC, LabView or NXT-G)</a:t>
+            </a:r>
+          </a:p>
+        </p:txBody>
+      </p:sp>
+      <p:sp>
+        <p:nvSpPr>
+          <p:cNvPr id="14341" name="TextBox 9"/>
           <p:cNvSpPr txBox="1">
             <a:spLocks noChangeArrowheads="1"/>
           </p:cNvSpPr>
@@ -4594,14 +4500,14 @@
       </p:sp>
       <p:pic>
         <p:nvPicPr>
-          <p:cNvPr id="14346" name="Picture 10" descr="v"/>
+          <p:cNvPr id="14342" name="Picture 10" descr="v"/>
           <p:cNvPicPr>
             <a:picLocks noChangeAspect="1" noChangeArrowheads="1"/>
           </p:cNvPicPr>
           <p:nvPr/>
         </p:nvPicPr>
         <p:blipFill>
-          <a:blip r:embed="rId2" cstate="print"/>
+          <a:blip r:embed="rId2"/>
           <a:srcRect l="13954" r="25581"/>
           <a:stretch>
             <a:fillRect/>
@@ -4616,15 +4522,23 @@
             <a:avLst/>
           </a:prstGeom>
           <a:noFill/>
+          <a:ln w="9525">
+            <a:noFill/>
+            <a:miter lim="800000"/>
+            <a:headEnd/>
+            <a:tailEnd/>
+          </a:ln>
         </p:spPr>
       </p:pic>
       <p:sp>
         <p:nvSpPr>
-          <p:cNvPr id="3" name="Rectangle 6"/>
-          <p:cNvSpPr/>
+          <p:cNvPr id="14343" name="Rectangle 6"/>
+          <p:cNvSpPr>
+            <a:spLocks noChangeArrowheads="1"/>
+          </p:cNvSpPr>
           <p:nvPr/>
         </p:nvSpPr>
-        <p:spPr>
+        <p:spPr bwMode="auto">
           <a:xfrm>
             <a:off x="2286000" y="914400"/>
             <a:ext cx="2057400" cy="2289175"/>
@@ -4632,6 +4546,13 @@
           <a:prstGeom prst="rect">
             <a:avLst/>
           </a:prstGeom>
+          <a:noFill/>
+          <a:ln w="9525">
+            <a:noFill/>
+            <a:miter lim="800000"/>
+            <a:headEnd/>
+            <a:tailEnd/>
+          </a:ln>
         </p:spPr>
         <p:txBody>
           <a:bodyPr>
@@ -4698,14 +4619,14 @@
       </p:sp>
       <p:pic>
         <p:nvPicPr>
-          <p:cNvPr id="14348" name="Picture 12" descr="v"/>
+          <p:cNvPr id="14344" name="Picture 12" descr="v"/>
           <p:cNvPicPr>
             <a:picLocks noChangeAspect="1" noChangeArrowheads="1"/>
           </p:cNvPicPr>
           <p:nvPr/>
         </p:nvPicPr>
         <p:blipFill>
-          <a:blip r:embed="rId3" cstate="print"/>
+          <a:blip r:embed="rId3"/>
           <a:srcRect l="16364" r="4546"/>
           <a:stretch>
             <a:fillRect/>
@@ -4714,37 +4635,52 @@
         <p:spPr bwMode="auto">
           <a:xfrm>
             <a:off x="4800600" y="685800"/>
-            <a:ext cx="2410047" cy="2286000"/>
+            <a:ext cx="2409825" cy="2286000"/>
           </a:xfrm>
           <a:prstGeom prst="rect">
             <a:avLst/>
           </a:prstGeom>
           <a:noFill/>
+          <a:ln w="9525">
+            <a:noFill/>
+            <a:miter lim="800000"/>
+            <a:headEnd/>
+            <a:tailEnd/>
+          </a:ln>
         </p:spPr>
       </p:pic>
       <p:sp>
         <p:nvSpPr>
-          <p:cNvPr id="5" name="Rectangle 6"/>
-          <p:cNvSpPr/>
+          <p:cNvPr id="14345" name="Rectangle 6"/>
+          <p:cNvSpPr>
+            <a:spLocks noChangeArrowheads="1"/>
+          </p:cNvSpPr>
           <p:nvPr/>
         </p:nvSpPr>
-        <p:spPr>
+        <p:spPr bwMode="auto">
           <a:xfrm>
             <a:off x="7315200" y="685800"/>
-            <a:ext cx="1676400" cy="2585323"/>
+            <a:ext cx="1676400" cy="2586038"/>
           </a:xfrm>
           <a:prstGeom prst="rect">
             <a:avLst/>
           </a:prstGeom>
+          <a:noFill/>
+          <a:ln w="9525">
+            <a:noFill/>
+            <a:miter lim="800000"/>
+            <a:headEnd/>
+            <a:tailEnd/>
+          </a:ln>
         </p:spPr>
         <p:txBody>
-          <a:bodyPr wrap="square">
+          <a:bodyPr>
             <a:spAutoFit/>
           </a:bodyPr>
           <a:lstStyle/>
           <a:p>
             <a:r>
-              <a:rPr lang="en-US" dirty="0">
+              <a:rPr lang="en-US">
                 <a:solidFill>
                   <a:srgbClr val="558ED5"/>
                 </a:solidFill>
@@ -4759,7 +4695,7 @@
               <a:buChar char="•"/>
             </a:pPr>
             <a:r>
-              <a:rPr lang="en-US" dirty="0">
+              <a:rPr lang="en-US">
                 <a:latin typeface="Calibri" pitchFamily="34" charset="0"/>
               </a:rPr>
               <a:t>Turns off when not in use</a:t>
@@ -4771,7 +4707,7 @@
               <a:buChar char="•"/>
             </a:pPr>
             <a:r>
-              <a:rPr lang="en-US" dirty="0">
+              <a:rPr lang="en-US">
                 <a:latin typeface="Calibri" pitchFamily="34" charset="0"/>
               </a:rPr>
               <a:t>Customizable settings!</a:t>
@@ -4783,7 +4719,7 @@
               <a:buChar char="•"/>
             </a:pPr>
             <a:r>
-              <a:rPr lang="en-US" dirty="0">
+              <a:rPr lang="en-US">
                 <a:latin typeface="Calibri" pitchFamily="34" charset="0"/>
               </a:rPr>
               <a:t>Programmable (with a special cable)</a:t>
@@ -4794,7 +4730,7 @@
               <a:buFontTx/>
               <a:buChar char="•"/>
             </a:pPr>
-            <a:endParaRPr lang="en-US" dirty="0">
+            <a:endParaRPr lang="en-US">
               <a:latin typeface="Calibri" pitchFamily="34" charset="0"/>
             </a:endParaRPr>
           </a:p>

</xml_diff>